<commit_message>
Completed Updates to Mod 03
</commit_message>
<xml_diff>
--- a/Modules/03-Chef_Intermediate.pptx
+++ b/Modules/03-Chef_Intermediate.pptx
@@ -225,7 +225,7 @@
           <a:p>
             <a:fld id="{00328D28-DA01-934D-B2A2-AFE04A61D1EA}" type="datetimeFigureOut">
               <a:rPr lang="en-US" smtClean="0"/>
-              <a:t>7/1/2015</a:t>
+              <a:t>7/2/2015</a:t>
             </a:fld>
             <a:endParaRPr lang="en-US" dirty="0"/>
           </a:p>
@@ -877,7 +877,7 @@
           <a:p>
             <a:fld id="{1D8BD707-D9CF-40AE-B4C6-C98DA3205C09}" type="datetimeFigureOut">
               <a:rPr lang="en-US"/>
-              <a:t>7/1/2015</a:t>
+              <a:t>7/2/2015</a:t>
             </a:fld>
             <a:endParaRPr lang="en-US" dirty="0"/>
           </a:p>
@@ -1060,7 +1060,7 @@
           <a:p>
             <a:fld id="{1D8BD707-D9CF-40AE-B4C6-C98DA3205C09}" type="datetimeFigureOut">
               <a:rPr lang="en-US"/>
-              <a:t>7/1/2015</a:t>
+              <a:t>7/2/2015</a:t>
             </a:fld>
             <a:endParaRPr lang="en-US" dirty="0"/>
           </a:p>
@@ -1102,6 +1102,132 @@
               <a:pPr marL="25400"/>
               <a:t>‹#›</a:t>
             </a:fld>
+            <a:endParaRPr lang="en-US" dirty="0"/>
+          </a:p>
+        </p:txBody>
+      </p:sp>
+      <p:sp>
+        <p:nvSpPr>
+          <p:cNvPr id="7" name="object 41"/>
+          <p:cNvSpPr txBox="1">
+            <a:spLocks/>
+          </p:cNvSpPr>
+          <p:nvPr userDrawn="1"/>
+        </p:nvSpPr>
+        <p:spPr>
+          <a:xfrm>
+            <a:off x="7823200" y="8686800"/>
+            <a:ext cx="533400" cy="251143"/>
+          </a:xfrm>
+          <a:prstGeom prst="rect">
+            <a:avLst/>
+          </a:prstGeom>
+        </p:spPr>
+        <p:txBody>
+          <a:bodyPr vert="horz" wrap="square" lIns="0" tIns="0" rIns="0" bIns="0" rtlCol="0">
+            <a:spAutoFit/>
+          </a:bodyPr>
+          <a:lstStyle>
+            <a:defPPr>
+              <a:defRPr lang="en-US"/>
+            </a:defPPr>
+            <a:lvl1pPr marL="0" algn="l" defTabSz="914400" rtl="0" eaLnBrk="1" latinLnBrk="0" hangingPunct="1">
+              <a:defRPr sz="1600" b="0" i="0" kern="1200">
+                <a:solidFill>
+                  <a:schemeClr val="tx1"/>
+                </a:solidFill>
+                <a:latin typeface="Gill Sans MT"/>
+                <a:ea typeface="+mn-ea"/>
+                <a:cs typeface="Gill Sans MT"/>
+              </a:defRPr>
+            </a:lvl1pPr>
+            <a:lvl2pPr marL="457200" algn="l" defTabSz="914400" rtl="0" eaLnBrk="1" latinLnBrk="0" hangingPunct="1">
+              <a:defRPr sz="1800" kern="1200">
+                <a:solidFill>
+                  <a:schemeClr val="tx1"/>
+                </a:solidFill>
+                <a:latin typeface="+mn-lt"/>
+                <a:ea typeface="+mn-ea"/>
+                <a:cs typeface="+mn-cs"/>
+              </a:defRPr>
+            </a:lvl2pPr>
+            <a:lvl3pPr marL="914400" algn="l" defTabSz="914400" rtl="0" eaLnBrk="1" latinLnBrk="0" hangingPunct="1">
+              <a:defRPr sz="1800" kern="1200">
+                <a:solidFill>
+                  <a:schemeClr val="tx1"/>
+                </a:solidFill>
+                <a:latin typeface="+mn-lt"/>
+                <a:ea typeface="+mn-ea"/>
+                <a:cs typeface="+mn-cs"/>
+              </a:defRPr>
+            </a:lvl3pPr>
+            <a:lvl4pPr marL="1371600" algn="l" defTabSz="914400" rtl="0" eaLnBrk="1" latinLnBrk="0" hangingPunct="1">
+              <a:defRPr sz="1800" kern="1200">
+                <a:solidFill>
+                  <a:schemeClr val="tx1"/>
+                </a:solidFill>
+                <a:latin typeface="+mn-lt"/>
+                <a:ea typeface="+mn-ea"/>
+                <a:cs typeface="+mn-cs"/>
+              </a:defRPr>
+            </a:lvl4pPr>
+            <a:lvl5pPr marL="1828800" algn="l" defTabSz="914400" rtl="0" eaLnBrk="1" latinLnBrk="0" hangingPunct="1">
+              <a:defRPr sz="1800" kern="1200">
+                <a:solidFill>
+                  <a:schemeClr val="tx1"/>
+                </a:solidFill>
+                <a:latin typeface="+mn-lt"/>
+                <a:ea typeface="+mn-ea"/>
+                <a:cs typeface="+mn-cs"/>
+              </a:defRPr>
+            </a:lvl5pPr>
+            <a:lvl6pPr marL="2286000" algn="l" defTabSz="914400" rtl="0" eaLnBrk="1" latinLnBrk="0" hangingPunct="1">
+              <a:defRPr sz="1800" kern="1200">
+                <a:solidFill>
+                  <a:schemeClr val="tx1"/>
+                </a:solidFill>
+                <a:latin typeface="+mn-lt"/>
+                <a:ea typeface="+mn-ea"/>
+                <a:cs typeface="+mn-cs"/>
+              </a:defRPr>
+            </a:lvl6pPr>
+            <a:lvl7pPr marL="2743200" algn="l" defTabSz="914400" rtl="0" eaLnBrk="1" latinLnBrk="0" hangingPunct="1">
+              <a:defRPr sz="1800" kern="1200">
+                <a:solidFill>
+                  <a:schemeClr val="tx1"/>
+                </a:solidFill>
+                <a:latin typeface="+mn-lt"/>
+                <a:ea typeface="+mn-ea"/>
+                <a:cs typeface="+mn-cs"/>
+              </a:defRPr>
+            </a:lvl7pPr>
+            <a:lvl8pPr marL="3200400" algn="l" defTabSz="914400" rtl="0" eaLnBrk="1" latinLnBrk="0" hangingPunct="1">
+              <a:defRPr sz="1800" kern="1200">
+                <a:solidFill>
+                  <a:schemeClr val="tx1"/>
+                </a:solidFill>
+                <a:latin typeface="+mn-lt"/>
+                <a:ea typeface="+mn-ea"/>
+                <a:cs typeface="+mn-cs"/>
+              </a:defRPr>
+            </a:lvl8pPr>
+            <a:lvl9pPr marL="3657600" algn="l" defTabSz="914400" rtl="0" eaLnBrk="1" latinLnBrk="0" hangingPunct="1">
+              <a:defRPr sz="1800" kern="1200">
+                <a:solidFill>
+                  <a:schemeClr val="tx1"/>
+                </a:solidFill>
+                <a:latin typeface="+mn-lt"/>
+                <a:ea typeface="+mn-ea"/>
+                <a:cs typeface="+mn-cs"/>
+              </a:defRPr>
+            </a:lvl9pPr>
+          </a:lstStyle>
+          <a:p>
+            <a:pPr marL="25400"/>
+            <a:r>
+              <a:rPr lang="en-US" dirty="0" smtClean="0"/>
+              <a:t>3-</a:t>
+            </a:r>
             <a:endParaRPr lang="en-US" dirty="0"/>
           </a:p>
         </p:txBody>
@@ -4307,7 +4433,7 @@
           <a:p>
             <a:fld id="{1D8BD707-D9CF-40AE-B4C6-C98DA3205C09}" type="datetimeFigureOut">
               <a:rPr lang="en-US"/>
-              <a:t>7/1/2015</a:t>
+              <a:t>7/2/2015</a:t>
             </a:fld>
             <a:endParaRPr lang="en-US" dirty="0"/>
           </a:p>
@@ -4461,7 +4587,7 @@
           <a:p>
             <a:fld id="{1D8BD707-D9CF-40AE-B4C6-C98DA3205C09}" type="datetimeFigureOut">
               <a:rPr lang="en-US"/>
-              <a:t>7/1/2015</a:t>
+              <a:t>7/2/2015</a:t>
             </a:fld>
             <a:endParaRPr lang="en-US" dirty="0"/>
           </a:p>
@@ -7634,7 +7760,7 @@
           <a:p>
             <a:fld id="{1D8BD707-D9CF-40AE-B4C6-C98DA3205C09}" type="datetimeFigureOut">
               <a:rPr lang="en-US"/>
-              <a:t>7/1/2015</a:t>
+              <a:t>7/2/2015</a:t>
             </a:fld>
             <a:endParaRPr lang="en-US" dirty="0"/>
           </a:p>
@@ -7915,7 +8041,7 @@
           <a:p>
             <a:fld id="{1D8BD707-D9CF-40AE-B4C6-C98DA3205C09}" type="datetimeFigureOut">
               <a:rPr lang="en-US"/>
-              <a:t>7/1/2015</a:t>
+              <a:t>7/2/2015</a:t>
             </a:fld>
             <a:endParaRPr lang="en-US" dirty="0"/>
           </a:p>
@@ -14294,6 +14420,265 @@
               <a:latin typeface="Arial"/>
               <a:cs typeface="Arial"/>
             </a:endParaRPr>
+          </a:p>
+        </p:txBody>
+      </p:sp>
+      <p:sp>
+        <p:nvSpPr>
+          <p:cNvPr id="76" name="Holder 5"/>
+          <p:cNvSpPr txBox="1">
+            <a:spLocks/>
+          </p:cNvSpPr>
+          <p:nvPr/>
+        </p:nvSpPr>
+        <p:spPr>
+          <a:xfrm>
+            <a:off x="203200" y="8649209"/>
+            <a:ext cx="3738880" cy="276999"/>
+          </a:xfrm>
+          <a:prstGeom prst="rect">
+            <a:avLst/>
+          </a:prstGeom>
+        </p:spPr>
+        <p:txBody>
+          <a:bodyPr lIns="0" tIns="0" rIns="0" bIns="0"/>
+          <a:lstStyle>
+            <a:defPPr>
+              <a:defRPr lang="en-US"/>
+            </a:defPPr>
+            <a:lvl1pPr marL="0" algn="l" defTabSz="914400" rtl="0" eaLnBrk="1" latinLnBrk="0" hangingPunct="1">
+              <a:defRPr sz="1800" kern="1200">
+                <a:solidFill>
+                  <a:schemeClr val="tx1">
+                    <a:tint val="75000"/>
+                  </a:schemeClr>
+                </a:solidFill>
+                <a:latin typeface="+mn-lt"/>
+                <a:ea typeface="+mn-ea"/>
+                <a:cs typeface="+mn-cs"/>
+              </a:defRPr>
+            </a:lvl1pPr>
+            <a:lvl2pPr marL="457200" algn="l" defTabSz="914400" rtl="0" eaLnBrk="1" latinLnBrk="0" hangingPunct="1">
+              <a:defRPr sz="1800" kern="1200">
+                <a:solidFill>
+                  <a:schemeClr val="tx1"/>
+                </a:solidFill>
+                <a:latin typeface="+mn-lt"/>
+                <a:ea typeface="+mn-ea"/>
+                <a:cs typeface="+mn-cs"/>
+              </a:defRPr>
+            </a:lvl2pPr>
+            <a:lvl3pPr marL="914400" algn="l" defTabSz="914400" rtl="0" eaLnBrk="1" latinLnBrk="0" hangingPunct="1">
+              <a:defRPr sz="1800" kern="1200">
+                <a:solidFill>
+                  <a:schemeClr val="tx1"/>
+                </a:solidFill>
+                <a:latin typeface="+mn-lt"/>
+                <a:ea typeface="+mn-ea"/>
+                <a:cs typeface="+mn-cs"/>
+              </a:defRPr>
+            </a:lvl3pPr>
+            <a:lvl4pPr marL="1371600" algn="l" defTabSz="914400" rtl="0" eaLnBrk="1" latinLnBrk="0" hangingPunct="1">
+              <a:defRPr sz="1800" kern="1200">
+                <a:solidFill>
+                  <a:schemeClr val="tx1"/>
+                </a:solidFill>
+                <a:latin typeface="+mn-lt"/>
+                <a:ea typeface="+mn-ea"/>
+                <a:cs typeface="+mn-cs"/>
+              </a:defRPr>
+            </a:lvl4pPr>
+            <a:lvl5pPr marL="1828800" algn="l" defTabSz="914400" rtl="0" eaLnBrk="1" latinLnBrk="0" hangingPunct="1">
+              <a:defRPr sz="1800" kern="1200">
+                <a:solidFill>
+                  <a:schemeClr val="tx1"/>
+                </a:solidFill>
+                <a:latin typeface="+mn-lt"/>
+                <a:ea typeface="+mn-ea"/>
+                <a:cs typeface="+mn-cs"/>
+              </a:defRPr>
+            </a:lvl5pPr>
+            <a:lvl6pPr marL="2286000" algn="l" defTabSz="914400" rtl="0" eaLnBrk="1" latinLnBrk="0" hangingPunct="1">
+              <a:defRPr sz="1800" kern="1200">
+                <a:solidFill>
+                  <a:schemeClr val="tx1"/>
+                </a:solidFill>
+                <a:latin typeface="+mn-lt"/>
+                <a:ea typeface="+mn-ea"/>
+                <a:cs typeface="+mn-cs"/>
+              </a:defRPr>
+            </a:lvl6pPr>
+            <a:lvl7pPr marL="2743200" algn="l" defTabSz="914400" rtl="0" eaLnBrk="1" latinLnBrk="0" hangingPunct="1">
+              <a:defRPr sz="1800" kern="1200">
+                <a:solidFill>
+                  <a:schemeClr val="tx1"/>
+                </a:solidFill>
+                <a:latin typeface="+mn-lt"/>
+                <a:ea typeface="+mn-ea"/>
+                <a:cs typeface="+mn-cs"/>
+              </a:defRPr>
+            </a:lvl7pPr>
+            <a:lvl8pPr marL="3200400" algn="l" defTabSz="914400" rtl="0" eaLnBrk="1" latinLnBrk="0" hangingPunct="1">
+              <a:defRPr sz="1800" kern="1200">
+                <a:solidFill>
+                  <a:schemeClr val="tx1"/>
+                </a:solidFill>
+                <a:latin typeface="+mn-lt"/>
+                <a:ea typeface="+mn-ea"/>
+                <a:cs typeface="+mn-cs"/>
+              </a:defRPr>
+            </a:lvl8pPr>
+            <a:lvl9pPr marL="3657600" algn="l" defTabSz="914400" rtl="0" eaLnBrk="1" latinLnBrk="0" hangingPunct="1">
+              <a:defRPr sz="1800" kern="1200">
+                <a:solidFill>
+                  <a:schemeClr val="tx1"/>
+                </a:solidFill>
+                <a:latin typeface="+mn-lt"/>
+                <a:ea typeface="+mn-ea"/>
+                <a:cs typeface="+mn-cs"/>
+              </a:defRPr>
+            </a:lvl9pPr>
+          </a:lstStyle>
+          <a:p>
+            <a:r>
+              <a:rPr lang="en-US" dirty="0" smtClean="0">
+                <a:solidFill>
+                  <a:srgbClr val="7D8689"/>
+                </a:solidFill>
+              </a:rPr>
+              <a:t>Copyright © 2015 Chef Software, Inc.</a:t>
+            </a:r>
+            <a:endParaRPr lang="en-US" dirty="0">
+              <a:solidFill>
+                <a:srgbClr val="7D8689"/>
+              </a:solidFill>
+            </a:endParaRPr>
+          </a:p>
+        </p:txBody>
+      </p:sp>
+      <p:sp>
+        <p:nvSpPr>
+          <p:cNvPr id="80" name="object 41"/>
+          <p:cNvSpPr txBox="1">
+            <a:spLocks/>
+          </p:cNvSpPr>
+          <p:nvPr/>
+        </p:nvSpPr>
+        <p:spPr>
+          <a:xfrm>
+            <a:off x="7823200" y="8686800"/>
+            <a:ext cx="533400" cy="251143"/>
+          </a:xfrm>
+          <a:prstGeom prst="rect">
+            <a:avLst/>
+          </a:prstGeom>
+        </p:spPr>
+        <p:txBody>
+          <a:bodyPr vert="horz" wrap="square" lIns="0" tIns="0" rIns="0" bIns="0" rtlCol="0">
+            <a:spAutoFit/>
+          </a:bodyPr>
+          <a:lstStyle>
+            <a:defPPr>
+              <a:defRPr lang="en-US"/>
+            </a:defPPr>
+            <a:lvl1pPr marL="0" algn="l" defTabSz="914400" rtl="0" eaLnBrk="1" latinLnBrk="0" hangingPunct="1">
+              <a:defRPr sz="1600" b="0" i="0" kern="1200">
+                <a:solidFill>
+                  <a:schemeClr val="tx1"/>
+                </a:solidFill>
+                <a:latin typeface="Gill Sans MT"/>
+                <a:ea typeface="+mn-ea"/>
+                <a:cs typeface="Gill Sans MT"/>
+              </a:defRPr>
+            </a:lvl1pPr>
+            <a:lvl2pPr marL="457200" algn="l" defTabSz="914400" rtl="0" eaLnBrk="1" latinLnBrk="0" hangingPunct="1">
+              <a:defRPr sz="1800" kern="1200">
+                <a:solidFill>
+                  <a:schemeClr val="tx1"/>
+                </a:solidFill>
+                <a:latin typeface="+mn-lt"/>
+                <a:ea typeface="+mn-ea"/>
+                <a:cs typeface="+mn-cs"/>
+              </a:defRPr>
+            </a:lvl2pPr>
+            <a:lvl3pPr marL="914400" algn="l" defTabSz="914400" rtl="0" eaLnBrk="1" latinLnBrk="0" hangingPunct="1">
+              <a:defRPr sz="1800" kern="1200">
+                <a:solidFill>
+                  <a:schemeClr val="tx1"/>
+                </a:solidFill>
+                <a:latin typeface="+mn-lt"/>
+                <a:ea typeface="+mn-ea"/>
+                <a:cs typeface="+mn-cs"/>
+              </a:defRPr>
+            </a:lvl3pPr>
+            <a:lvl4pPr marL="1371600" algn="l" defTabSz="914400" rtl="0" eaLnBrk="1" latinLnBrk="0" hangingPunct="1">
+              <a:defRPr sz="1800" kern="1200">
+                <a:solidFill>
+                  <a:schemeClr val="tx1"/>
+                </a:solidFill>
+                <a:latin typeface="+mn-lt"/>
+                <a:ea typeface="+mn-ea"/>
+                <a:cs typeface="+mn-cs"/>
+              </a:defRPr>
+            </a:lvl4pPr>
+            <a:lvl5pPr marL="1828800" algn="l" defTabSz="914400" rtl="0" eaLnBrk="1" latinLnBrk="0" hangingPunct="1">
+              <a:defRPr sz="1800" kern="1200">
+                <a:solidFill>
+                  <a:schemeClr val="tx1"/>
+                </a:solidFill>
+                <a:latin typeface="+mn-lt"/>
+                <a:ea typeface="+mn-ea"/>
+                <a:cs typeface="+mn-cs"/>
+              </a:defRPr>
+            </a:lvl5pPr>
+            <a:lvl6pPr marL="2286000" algn="l" defTabSz="914400" rtl="0" eaLnBrk="1" latinLnBrk="0" hangingPunct="1">
+              <a:defRPr sz="1800" kern="1200">
+                <a:solidFill>
+                  <a:schemeClr val="tx1"/>
+                </a:solidFill>
+                <a:latin typeface="+mn-lt"/>
+                <a:ea typeface="+mn-ea"/>
+                <a:cs typeface="+mn-cs"/>
+              </a:defRPr>
+            </a:lvl6pPr>
+            <a:lvl7pPr marL="2743200" algn="l" defTabSz="914400" rtl="0" eaLnBrk="1" latinLnBrk="0" hangingPunct="1">
+              <a:defRPr sz="1800" kern="1200">
+                <a:solidFill>
+                  <a:schemeClr val="tx1"/>
+                </a:solidFill>
+                <a:latin typeface="+mn-lt"/>
+                <a:ea typeface="+mn-ea"/>
+                <a:cs typeface="+mn-cs"/>
+              </a:defRPr>
+            </a:lvl7pPr>
+            <a:lvl8pPr marL="3200400" algn="l" defTabSz="914400" rtl="0" eaLnBrk="1" latinLnBrk="0" hangingPunct="1">
+              <a:defRPr sz="1800" kern="1200">
+                <a:solidFill>
+                  <a:schemeClr val="tx1"/>
+                </a:solidFill>
+                <a:latin typeface="+mn-lt"/>
+                <a:ea typeface="+mn-ea"/>
+                <a:cs typeface="+mn-cs"/>
+              </a:defRPr>
+            </a:lvl8pPr>
+            <a:lvl9pPr marL="3657600" algn="l" defTabSz="914400" rtl="0" eaLnBrk="1" latinLnBrk="0" hangingPunct="1">
+              <a:defRPr sz="1800" kern="1200">
+                <a:solidFill>
+                  <a:schemeClr val="tx1"/>
+                </a:solidFill>
+                <a:latin typeface="+mn-lt"/>
+                <a:ea typeface="+mn-ea"/>
+                <a:cs typeface="+mn-cs"/>
+              </a:defRPr>
+            </a:lvl9pPr>
+          </a:lstStyle>
+          <a:p>
+            <a:pPr marL="25400"/>
+            <a:r>
+              <a:rPr lang="en-US" dirty="0" smtClean="0"/>
+              <a:t>3-</a:t>
+            </a:r>
+            <a:endParaRPr lang="en-US" dirty="0"/>
           </a:p>
         </p:txBody>
       </p:sp>

</xml_diff>